<commit_message>
add discuss pic and modify ptt
</commit_message>
<xml_diff>
--- a/document/PPT/進度.pptx
+++ b/document/PPT/進度.pptx
@@ -9,8 +9,8 @@
   </p:notesMasterIdLst>
   <p:sldIdLst>
     <p:sldId id="256" r:id="rId2"/>
-    <p:sldId id="268" r:id="rId3"/>
-    <p:sldId id="270" r:id="rId4"/>
+    <p:sldId id="270" r:id="rId3"/>
+    <p:sldId id="268" r:id="rId4"/>
     <p:sldId id="269" r:id="rId5"/>
   </p:sldIdLst>
   <p:sldSz cx="12192000" cy="6858000"/>
@@ -200,7 +200,7 @@
           <a:p>
             <a:fld id="{73924AC3-B293-4E41-ABCB-E2745FDAEE5B}" type="datetimeFigureOut">
               <a:rPr kumimoji="1" lang="zh-TW" altLang="en-US" smtClean="0"/>
-              <a:t>2018/3/12</a:t>
+              <a:t>2018/3/19</a:t>
             </a:fld>
             <a:endParaRPr kumimoji="1" lang="zh-TW" altLang="en-US"/>
           </a:p>
@@ -698,7 +698,7 @@
             <a:fld id="{B61BEF0D-F0BB-DE4B-95CE-6DB70DBA9567}" type="datetimeFigureOut">
               <a:rPr lang="en-US" dirty="0"/>
               <a:pPr/>
-              <a:t>3/12/18</a:t>
+              <a:t>3/19/18</a:t>
             </a:fld>
             <a:endParaRPr lang="en-US" dirty="0"/>
           </a:p>
@@ -1029,7 +1029,7 @@
             <a:fld id="{B61BEF0D-F0BB-DE4B-95CE-6DB70DBA9567}" type="datetimeFigureOut">
               <a:rPr lang="en-US" dirty="0"/>
               <a:pPr/>
-              <a:t>3/12/18</a:t>
+              <a:t>3/19/18</a:t>
             </a:fld>
             <a:endParaRPr lang="en-US" dirty="0"/>
           </a:p>
@@ -1304,7 +1304,7 @@
             <a:fld id="{B61BEF0D-F0BB-DE4B-95CE-6DB70DBA9567}" type="datetimeFigureOut">
               <a:rPr lang="en-US" dirty="0"/>
               <a:pPr/>
-              <a:t>3/12/18</a:t>
+              <a:t>3/19/18</a:t>
             </a:fld>
             <a:endParaRPr lang="en-US" dirty="0"/>
           </a:p>
@@ -1869,7 +1869,7 @@
             <a:fld id="{B61BEF0D-F0BB-DE4B-95CE-6DB70DBA9567}" type="datetimeFigureOut">
               <a:rPr lang="en-US" dirty="0"/>
               <a:pPr/>
-              <a:t>3/12/18</a:t>
+              <a:t>3/19/18</a:t>
             </a:fld>
             <a:endParaRPr lang="en-US" dirty="0"/>
           </a:p>
@@ -2144,7 +2144,7 @@
             <a:fld id="{B61BEF0D-F0BB-DE4B-95CE-6DB70DBA9567}" type="datetimeFigureOut">
               <a:rPr lang="en-US" dirty="0"/>
               <a:pPr/>
-              <a:t>3/12/18</a:t>
+              <a:t>3/19/18</a:t>
             </a:fld>
             <a:endParaRPr lang="en-US" dirty="0"/>
           </a:p>
@@ -2703,7 +2703,7 @@
             <a:fld id="{B61BEF0D-F0BB-DE4B-95CE-6DB70DBA9567}" type="datetimeFigureOut">
               <a:rPr lang="en-US" dirty="0"/>
               <a:pPr/>
-              <a:t>3/12/18</a:t>
+              <a:t>3/19/18</a:t>
             </a:fld>
             <a:endParaRPr lang="en-US" dirty="0"/>
           </a:p>
@@ -3027,7 +3027,7 @@
             <a:fld id="{B61BEF0D-F0BB-DE4B-95CE-6DB70DBA9567}" type="datetimeFigureOut">
               <a:rPr lang="en-US" dirty="0"/>
               <a:pPr/>
-              <a:t>3/12/18</a:t>
+              <a:t>3/19/18</a:t>
             </a:fld>
             <a:endParaRPr lang="en-US" dirty="0"/>
           </a:p>
@@ -3201,7 +3201,7 @@
             <a:fld id="{B61BEF0D-F0BB-DE4B-95CE-6DB70DBA9567}" type="datetimeFigureOut">
               <a:rPr lang="en-US" dirty="0"/>
               <a:pPr/>
-              <a:t>3/12/18</a:t>
+              <a:t>3/19/18</a:t>
             </a:fld>
             <a:endParaRPr lang="en-US" dirty="0"/>
           </a:p>
@@ -3436,7 +3436,7 @@
             <a:fld id="{B61BEF0D-F0BB-DE4B-95CE-6DB70DBA9567}" type="datetimeFigureOut">
               <a:rPr lang="en-US" dirty="0"/>
               <a:pPr/>
-              <a:t>3/12/18</a:t>
+              <a:t>3/19/18</a:t>
             </a:fld>
             <a:endParaRPr lang="en-US" dirty="0"/>
           </a:p>
@@ -3633,7 +3633,7 @@
             <a:fld id="{B61BEF0D-F0BB-DE4B-95CE-6DB70DBA9567}" type="datetimeFigureOut">
               <a:rPr lang="en-US" dirty="0"/>
               <a:pPr/>
-              <a:t>3/12/18</a:t>
+              <a:t>3/19/18</a:t>
             </a:fld>
             <a:endParaRPr lang="en-US" dirty="0"/>
           </a:p>
@@ -3906,7 +3906,7 @@
             <a:fld id="{B61BEF0D-F0BB-DE4B-95CE-6DB70DBA9567}" type="datetimeFigureOut">
               <a:rPr lang="en-US" dirty="0"/>
               <a:pPr/>
-              <a:t>3/12/18</a:t>
+              <a:t>3/19/18</a:t>
             </a:fld>
             <a:endParaRPr lang="en-US" dirty="0"/>
           </a:p>
@@ -4169,7 +4169,7 @@
             <a:fld id="{B61BEF0D-F0BB-DE4B-95CE-6DB70DBA9567}" type="datetimeFigureOut">
               <a:rPr lang="en-US" dirty="0"/>
               <a:pPr/>
-              <a:t>3/12/18</a:t>
+              <a:t>3/19/18</a:t>
             </a:fld>
             <a:endParaRPr lang="en-US" dirty="0"/>
           </a:p>
@@ -4540,7 +4540,7 @@
             <a:fld id="{B61BEF0D-F0BB-DE4B-95CE-6DB70DBA9567}" type="datetimeFigureOut">
               <a:rPr lang="en-US" dirty="0"/>
               <a:pPr/>
-              <a:t>3/12/18</a:t>
+              <a:t>3/19/18</a:t>
             </a:fld>
             <a:endParaRPr lang="en-US" dirty="0"/>
           </a:p>
@@ -4685,7 +4685,7 @@
             <a:fld id="{B61BEF0D-F0BB-DE4B-95CE-6DB70DBA9567}" type="datetimeFigureOut">
               <a:rPr lang="en-US" dirty="0"/>
               <a:pPr/>
-              <a:t>3/12/18</a:t>
+              <a:t>3/19/18</a:t>
             </a:fld>
             <a:endParaRPr lang="en-US" dirty="0"/>
           </a:p>
@@ -4807,7 +4807,7 @@
             <a:fld id="{B61BEF0D-F0BB-DE4B-95CE-6DB70DBA9567}" type="datetimeFigureOut">
               <a:rPr lang="en-US" dirty="0"/>
               <a:pPr/>
-              <a:t>3/12/18</a:t>
+              <a:t>3/19/18</a:t>
             </a:fld>
             <a:endParaRPr lang="en-US" dirty="0"/>
           </a:p>
@@ -5089,7 +5089,7 @@
             <a:fld id="{B61BEF0D-F0BB-DE4B-95CE-6DB70DBA9567}" type="datetimeFigureOut">
               <a:rPr lang="en-US" dirty="0"/>
               <a:pPr/>
-              <a:t>3/12/18</a:t>
+              <a:t>3/19/18</a:t>
             </a:fld>
             <a:endParaRPr lang="en-US" dirty="0"/>
           </a:p>
@@ -5410,7 +5410,7 @@
             <a:fld id="{B61BEF0D-F0BB-DE4B-95CE-6DB70DBA9567}" type="datetimeFigureOut">
               <a:rPr lang="en-US" dirty="0"/>
               <a:pPr/>
-              <a:t>3/12/18</a:t>
+              <a:t>3/19/18</a:t>
             </a:fld>
             <a:endParaRPr lang="en-US" dirty="0"/>
           </a:p>
@@ -5621,7 +5621,7 @@
             <a:fld id="{B61BEF0D-F0BB-DE4B-95CE-6DB70DBA9567}" type="datetimeFigureOut">
               <a:rPr lang="en-US" dirty="0"/>
               <a:pPr/>
-              <a:t>3/12/18</a:t>
+              <a:t>3/19/18</a:t>
             </a:fld>
             <a:endParaRPr lang="en-US" dirty="0"/>
           </a:p>
@@ -6240,7 +6240,15 @@
             </a:r>
             <a:r>
               <a:rPr kumimoji="1" lang="zh-TW" altLang="en-US" dirty="0" smtClean="0"/>
-              <a:t>進度 資料輸入輸出頁</a:t>
+              <a:t>進度 </a:t>
+            </a:r>
+            <a:r>
+              <a:rPr kumimoji="1" lang="en-US" altLang="zh-TW" dirty="0" smtClean="0"/>
+              <a:t>selenium service </a:t>
+            </a:r>
+            <a:r>
+              <a:rPr kumimoji="1" lang="zh-TW" altLang="en-US" dirty="0" smtClean="0"/>
+              <a:t> </a:t>
             </a:r>
             <a:endParaRPr kumimoji="1" lang="zh-TW" altLang="en-US" dirty="0"/>
           </a:p>
@@ -6269,27 +6277,42 @@
           <a:lstStyle/>
           <a:p>
             <a:r>
-              <a:rPr kumimoji="1" lang="zh-TW" altLang="en-US" sz="2000" dirty="0" smtClean="0"/>
-              <a:t>頁面版型設計 </a:t>
+              <a:rPr kumimoji="1" lang="en-US" altLang="zh-TW" sz="2000" dirty="0" smtClean="0"/>
+              <a:t>WebDriver </a:t>
+            </a:r>
+            <a:r>
+              <a:rPr kumimoji="1" lang="en-US" altLang="zh-TW" sz="2000" dirty="0" err="1" smtClean="0"/>
+              <a:t>util</a:t>
+            </a:r>
+            <a:r>
+              <a:rPr kumimoji="1" lang="en-US" altLang="zh-TW" sz="2000" dirty="0" smtClean="0"/>
+              <a:t> </a:t>
             </a:r>
             <a:r>
               <a:rPr kumimoji="1" lang="mr-IN" altLang="zh-TW" sz="2000" dirty="0" smtClean="0"/>
               <a:t>–</a:t>
             </a:r>
             <a:r>
+              <a:rPr kumimoji="1" lang="en-US" altLang="zh-TW" sz="2000" dirty="0"/>
+              <a:t> </a:t>
+            </a:r>
+            <a:r>
+              <a:rPr kumimoji="1" lang="en-US" altLang="zh-TW" sz="2000" dirty="0" smtClean="0"/>
+              <a:t>100%</a:t>
+            </a:r>
+          </a:p>
+          <a:p>
+            <a:r>
+              <a:rPr kumimoji="1" lang="zh-TW" altLang="en-US" sz="2000" dirty="0" smtClean="0"/>
+              <a:t>頁面流程控制共用父類</a:t>
+            </a:r>
+            <a:r>
               <a:rPr kumimoji="1" lang="en-US" altLang="zh-TW" sz="2000" dirty="0" smtClean="0"/>
               <a:t> </a:t>
             </a:r>
             <a:r>
-              <a:rPr kumimoji="1" lang="en-US" altLang="zh-TW" sz="2000" dirty="0" smtClean="0"/>
-              <a:t>10%</a:t>
-            </a:r>
-            <a:endParaRPr kumimoji="1" lang="en-US" altLang="zh-TW" sz="2000" dirty="0" smtClean="0"/>
-          </a:p>
-          <a:p>
-            <a:r>
               <a:rPr kumimoji="1" lang="zh-TW" altLang="en-US" sz="2000" dirty="0" smtClean="0"/>
-              <a:t>前端頁面資料輸入 </a:t>
+              <a:t> </a:t>
             </a:r>
             <a:r>
               <a:rPr kumimoji="1" lang="mr-IN" altLang="zh-TW" sz="2000" dirty="0" smtClean="0"/>
@@ -6297,35 +6320,17 @@
             </a:r>
             <a:r>
               <a:rPr kumimoji="1" lang="en-US" altLang="zh-TW" sz="2000" dirty="0" smtClean="0"/>
-              <a:t> 0%</a:t>
-            </a:r>
-          </a:p>
-          <a:p>
+              <a:t> 100%</a:t>
+            </a:r>
+          </a:p>
+          <a:p>
+            <a:r>
+              <a:rPr kumimoji="1" lang="en-US" altLang="zh-TW" sz="2000" dirty="0" smtClean="0"/>
+              <a:t>PCL Step1- Step5</a:t>
+            </a:r>
             <a:r>
               <a:rPr kumimoji="1" lang="zh-TW" altLang="en-US" sz="2000" dirty="0" smtClean="0"/>
-              <a:t>資料轉換成特定格式進入</a:t>
-            </a:r>
-            <a:r>
-              <a:rPr kumimoji="1" lang="en-US" altLang="zh-TW" sz="2000" dirty="0" smtClean="0"/>
-              <a:t>DB</a:t>
-            </a:r>
-            <a:r>
-              <a:rPr kumimoji="1" lang="mr-IN" altLang="zh-TW" sz="2000" dirty="0"/>
-              <a:t> –</a:t>
-            </a:r>
-            <a:r>
-              <a:rPr kumimoji="1" lang="en-US" altLang="zh-TW" sz="2000" dirty="0"/>
-              <a:t> 0</a:t>
-            </a:r>
-            <a:r>
-              <a:rPr kumimoji="1" lang="en-US" altLang="zh-TW" sz="2000" dirty="0" smtClean="0"/>
-              <a:t>%</a:t>
-            </a:r>
-          </a:p>
-          <a:p>
-            <a:r>
-              <a:rPr kumimoji="1" lang="en-US" altLang="zh-TW" sz="2000" dirty="0" smtClean="0"/>
-              <a:t>Core process control handler </a:t>
+              <a:t> 頁面控制子類別實作 </a:t>
             </a:r>
             <a:r>
               <a:rPr kumimoji="1" lang="mr-IN" altLang="zh-TW" sz="2000" dirty="0"/>
@@ -6333,59 +6338,30 @@
             </a:r>
             <a:r>
               <a:rPr kumimoji="1" lang="en-US" altLang="zh-TW" sz="2000" dirty="0"/>
-              <a:t> 0%</a:t>
-            </a:r>
-            <a:endParaRPr kumimoji="1" lang="en-US" altLang="zh-TW" sz="2000" dirty="0" smtClean="0"/>
-          </a:p>
-          <a:p>
-            <a:r>
-              <a:rPr kumimoji="1" lang="zh-TW" altLang="en-US" sz="2000" dirty="0" smtClean="0"/>
-              <a:t>從</a:t>
+              <a:t> </a:t>
             </a:r>
             <a:r>
               <a:rPr kumimoji="1" lang="en-US" altLang="zh-TW" sz="2000" dirty="0" smtClean="0"/>
-              <a:t>DB</a:t>
-            </a:r>
-            <a:r>
-              <a:rPr kumimoji="1" lang="zh-TW" altLang="en-US" sz="2000" dirty="0" smtClean="0"/>
-              <a:t>讀出</a:t>
-            </a:r>
+              <a:t>100%</a:t>
+            </a:r>
+          </a:p>
+          <a:p>
             <a:r>
               <a:rPr kumimoji="1" lang="en-US" altLang="zh-TW" sz="2000" dirty="0" smtClean="0"/>
-              <a:t>test case</a:t>
-            </a:r>
-            <a:r>
-              <a:rPr kumimoji="1" lang="zh-TW" altLang="en-US" sz="2000" dirty="0" smtClean="0"/>
-              <a:t>於</a:t>
-            </a:r>
-            <a:r>
-              <a:rPr kumimoji="1" lang="en-US" altLang="zh-TW" sz="2000" dirty="0" smtClean="0"/>
-              <a:t>page </a:t>
-            </a:r>
-            <a:r>
-              <a:rPr kumimoji="1" lang="zh-TW" altLang="en-US" sz="2000" dirty="0" smtClean="0"/>
-              <a:t>供選用</a:t>
-            </a:r>
-            <a:r>
-              <a:rPr kumimoji="1" lang="en-US" altLang="zh-TW" sz="2000" dirty="0" smtClean="0"/>
-              <a:t> </a:t>
+              <a:t>Test case control service father class </a:t>
             </a:r>
             <a:r>
               <a:rPr kumimoji="1" lang="mr-IN" altLang="zh-TW" sz="2000" dirty="0" smtClean="0"/>
               <a:t>–</a:t>
             </a:r>
             <a:r>
+              <a:rPr kumimoji="1" lang="zh-TW" altLang="en-US" sz="2000" dirty="0" smtClean="0"/>
+              <a:t> </a:t>
+            </a:r>
+            <a:r>
               <a:rPr kumimoji="1" lang="en-US" altLang="zh-TW" sz="2000" dirty="0" smtClean="0"/>
-              <a:t> </a:t>
-            </a:r>
-            <a:r>
-              <a:rPr kumimoji="1" lang="en-US" altLang="zh-TW" sz="2000" dirty="0"/>
-              <a:t>0%</a:t>
-            </a:r>
-            <a:endParaRPr kumimoji="1" lang="en-US" altLang="zh-TW" sz="2000" dirty="0" smtClean="0"/>
-          </a:p>
-          <a:p>
-            <a:endParaRPr kumimoji="1" lang="en-US" altLang="zh-TW" sz="2000" dirty="0" smtClean="0"/>
+              <a:t>100%</a:t>
+            </a:r>
           </a:p>
           <a:p>
             <a:endParaRPr kumimoji="1" lang="en-US" altLang="zh-TW" sz="2000" dirty="0" smtClean="0"/>
@@ -6395,7 +6371,7 @@
     </p:spTree>
     <p:extLst>
       <p:ext uri="{BB962C8B-B14F-4D97-AF65-F5344CB8AC3E}">
-        <p14:creationId xmlns:p14="http://schemas.microsoft.com/office/powerpoint/2010/main" val="1292782152"/>
+        <p14:creationId xmlns:p14="http://schemas.microsoft.com/office/powerpoint/2010/main" val="1208590055"/>
       </p:ext>
     </p:extLst>
   </p:cSld>
@@ -6455,15 +6431,7 @@
             </a:r>
             <a:r>
               <a:rPr kumimoji="1" lang="zh-TW" altLang="en-US" dirty="0" smtClean="0"/>
-              <a:t>進度 </a:t>
-            </a:r>
-            <a:r>
-              <a:rPr kumimoji="1" lang="en-US" altLang="zh-TW" dirty="0" smtClean="0"/>
-              <a:t>selenium service </a:t>
-            </a:r>
-            <a:r>
-              <a:rPr kumimoji="1" lang="zh-TW" altLang="en-US" dirty="0" smtClean="0"/>
-              <a:t> </a:t>
+              <a:t>進度 資料輸入輸出頁</a:t>
             </a:r>
             <a:endParaRPr kumimoji="1" lang="zh-TW" altLang="en-US" dirty="0"/>
           </a:p>
@@ -6492,12 +6460,97 @@
           <a:lstStyle/>
           <a:p>
             <a:r>
+              <a:rPr kumimoji="1" lang="zh-TW" altLang="en-US" sz="2000" dirty="0" smtClean="0"/>
+              <a:t>頁面版型設計 </a:t>
+            </a:r>
+            <a:r>
+              <a:rPr kumimoji="1" lang="mr-IN" altLang="zh-TW" sz="2000" dirty="0" smtClean="0"/>
+              <a:t>–</a:t>
+            </a:r>
+            <a:r>
               <a:rPr kumimoji="1" lang="en-US" altLang="zh-TW" sz="2000" dirty="0" smtClean="0"/>
-              <a:t>WebDriver </a:t>
-            </a:r>
-            <a:r>
-              <a:rPr kumimoji="1" lang="en-US" altLang="zh-TW" sz="2000" dirty="0" err="1" smtClean="0"/>
-              <a:t>util</a:t>
+              <a:t> 70%</a:t>
+            </a:r>
+          </a:p>
+          <a:p>
+            <a:r>
+              <a:rPr kumimoji="1" lang="zh-TW" altLang="en-US" sz="2000" dirty="0" smtClean="0"/>
+              <a:t>前端頁面資料輸入 </a:t>
+            </a:r>
+            <a:r>
+              <a:rPr kumimoji="1" lang="mr-IN" altLang="zh-TW" sz="2000" dirty="0" smtClean="0"/>
+              <a:t>–</a:t>
+            </a:r>
+            <a:r>
+              <a:rPr kumimoji="1" lang="en-US" altLang="zh-TW" sz="2000" dirty="0" smtClean="0"/>
+              <a:t> 30%</a:t>
+            </a:r>
+          </a:p>
+          <a:p>
+            <a:r>
+              <a:rPr kumimoji="1" lang="zh-TW" altLang="en-US" sz="2000" dirty="0" smtClean="0"/>
+              <a:t>資料轉換成特定格式進入</a:t>
+            </a:r>
+            <a:r>
+              <a:rPr kumimoji="1" lang="en-US" altLang="zh-TW" sz="2000" dirty="0" smtClean="0"/>
+              <a:t>DB</a:t>
+            </a:r>
+            <a:r>
+              <a:rPr kumimoji="1" lang="mr-IN" altLang="zh-TW" sz="2000" dirty="0"/>
+              <a:t> –</a:t>
+            </a:r>
+            <a:r>
+              <a:rPr kumimoji="1" lang="en-US" altLang="zh-TW" sz="2000" dirty="0"/>
+              <a:t> 0</a:t>
+            </a:r>
+            <a:r>
+              <a:rPr kumimoji="1" lang="en-US" altLang="zh-TW" sz="2000" dirty="0" smtClean="0"/>
+              <a:t>%</a:t>
+            </a:r>
+          </a:p>
+          <a:p>
+            <a:r>
+              <a:rPr kumimoji="1" lang="en-US" altLang="zh-TW" sz="2000" dirty="0" smtClean="0"/>
+              <a:t>Core process control handler </a:t>
+            </a:r>
+            <a:r>
+              <a:rPr kumimoji="1" lang="mr-IN" altLang="zh-TW" sz="2000" dirty="0"/>
+              <a:t>–</a:t>
+            </a:r>
+            <a:r>
+              <a:rPr kumimoji="1" lang="en-US" altLang="zh-TW" sz="2000" dirty="0"/>
+              <a:t> 0%</a:t>
+            </a:r>
+            <a:endParaRPr kumimoji="1" lang="en-US" altLang="zh-TW" sz="2000" dirty="0" smtClean="0"/>
+          </a:p>
+          <a:p>
+            <a:r>
+              <a:rPr kumimoji="1" lang="zh-TW" altLang="en-US" sz="2000" dirty="0" smtClean="0"/>
+              <a:t>從</a:t>
+            </a:r>
+            <a:r>
+              <a:rPr kumimoji="1" lang="en-US" altLang="zh-TW" sz="2000" dirty="0" smtClean="0"/>
+              <a:t>DB</a:t>
+            </a:r>
+            <a:r>
+              <a:rPr kumimoji="1" lang="zh-TW" altLang="en-US" sz="2000" dirty="0" smtClean="0"/>
+              <a:t>讀出</a:t>
+            </a:r>
+            <a:r>
+              <a:rPr kumimoji="1" lang="en-US" altLang="zh-TW" sz="2000" dirty="0" smtClean="0"/>
+              <a:t>test case</a:t>
+            </a:r>
+            <a:r>
+              <a:rPr kumimoji="1" lang="zh-TW" altLang="en-US" sz="2000" dirty="0" smtClean="0"/>
+              <a:t>於</a:t>
+            </a:r>
+            <a:r>
+              <a:rPr kumimoji="1" lang="en-US" altLang="zh-TW" sz="2000" dirty="0" smtClean="0"/>
+              <a:t>page </a:t>
+            </a:r>
+            <a:r>
+              <a:rPr kumimoji="1" lang="zh-TW" altLang="en-US" sz="2000" dirty="0" smtClean="0"/>
+              <a:t>供選用</a:t>
             </a:r>
             <a:r>
               <a:rPr kumimoji="1" lang="en-US" altLang="zh-TW" sz="2000" dirty="0" smtClean="0"/>
@@ -6508,108 +6561,14 @@
               <a:t>–</a:t>
             </a:r>
             <a:r>
-              <a:rPr kumimoji="1" lang="en-US" altLang="zh-TW" sz="2000" dirty="0"/>
-              <a:t> </a:t>
-            </a:r>
-            <a:r>
-              <a:rPr kumimoji="1" lang="en-US" altLang="zh-TW" sz="2000" dirty="0" smtClean="0"/>
-              <a:t>100%</a:t>
-            </a:r>
-          </a:p>
-          <a:p>
-            <a:r>
-              <a:rPr kumimoji="1" lang="zh-TW" altLang="en-US" sz="2000" dirty="0" smtClean="0"/>
-              <a:t>頁面流程控制共用父類</a:t>
-            </a:r>
-            <a:r>
               <a:rPr kumimoji="1" lang="en-US" altLang="zh-TW" sz="2000" dirty="0" smtClean="0"/>
               <a:t> </a:t>
             </a:r>
             <a:r>
-              <a:rPr kumimoji="1" lang="zh-TW" altLang="en-US" sz="2000" dirty="0" smtClean="0"/>
-              <a:t> </a:t>
-            </a:r>
-            <a:r>
-              <a:rPr kumimoji="1" lang="mr-IN" altLang="zh-TW" sz="2000" dirty="0" smtClean="0"/>
-              <a:t>–</a:t>
-            </a:r>
-            <a:r>
-              <a:rPr kumimoji="1" lang="en-US" altLang="zh-TW" sz="2000" dirty="0" smtClean="0"/>
-              <a:t> </a:t>
-            </a:r>
-            <a:r>
-              <a:rPr kumimoji="1" lang="en-US" altLang="zh-TW" sz="2000" dirty="0" smtClean="0"/>
-              <a:t>70%</a:t>
+              <a:rPr kumimoji="1" lang="en-US" altLang="zh-TW" sz="2000" dirty="0"/>
+              <a:t>0%</a:t>
             </a:r>
             <a:endParaRPr kumimoji="1" lang="en-US" altLang="zh-TW" sz="2000" dirty="0" smtClean="0"/>
-          </a:p>
-          <a:p>
-            <a:r>
-              <a:rPr kumimoji="1" lang="en-US" altLang="zh-TW" sz="2000" dirty="0" smtClean="0"/>
-              <a:t>PCL Step1- Step5</a:t>
-            </a:r>
-            <a:r>
-              <a:rPr kumimoji="1" lang="zh-TW" altLang="en-US" sz="2000" dirty="0" smtClean="0"/>
-              <a:t> 頁面控制子類別實作 </a:t>
-            </a:r>
-            <a:r>
-              <a:rPr kumimoji="1" lang="mr-IN" altLang="zh-TW" sz="2000" dirty="0"/>
-              <a:t>–</a:t>
-            </a:r>
-            <a:r>
-              <a:rPr kumimoji="1" lang="en-US" altLang="zh-TW" sz="2000" dirty="0"/>
-              <a:t> </a:t>
-            </a:r>
-            <a:r>
-              <a:rPr kumimoji="1" lang="en-US" altLang="zh-TW" sz="2000" dirty="0" smtClean="0"/>
-              <a:t>5%</a:t>
-            </a:r>
-            <a:endParaRPr kumimoji="1" lang="en-US" altLang="zh-TW" sz="2000" dirty="0" smtClean="0"/>
-          </a:p>
-          <a:p>
-            <a:r>
-              <a:rPr kumimoji="1" lang="en-US" altLang="zh-TW" sz="2000" dirty="0" smtClean="0"/>
-              <a:t>Test case control service father class </a:t>
-            </a:r>
-            <a:r>
-              <a:rPr kumimoji="1" lang="mr-IN" altLang="zh-TW" sz="2000" dirty="0" smtClean="0"/>
-              <a:t>–</a:t>
-            </a:r>
-            <a:r>
-              <a:rPr kumimoji="1" lang="zh-TW" altLang="en-US" sz="2000" dirty="0" smtClean="0"/>
-              <a:t> </a:t>
-            </a:r>
-            <a:r>
-              <a:rPr kumimoji="1" lang="en-US" altLang="zh-TW" sz="2000" dirty="0" smtClean="0"/>
-              <a:t>10</a:t>
-            </a:r>
-            <a:r>
-              <a:rPr kumimoji="1" lang="en-US" altLang="zh-TW" sz="2000" dirty="0" smtClean="0"/>
-              <a:t>%</a:t>
-            </a:r>
-            <a:endParaRPr kumimoji="1" lang="en-US" altLang="zh-TW" sz="2000" dirty="0" smtClean="0"/>
-          </a:p>
-          <a:p>
-            <a:r>
-              <a:rPr kumimoji="1" lang="en-US" altLang="zh-TW" sz="2000" dirty="0" smtClean="0"/>
-              <a:t>PCL project test case control service </a:t>
-            </a:r>
-            <a:r>
-              <a:rPr kumimoji="1" lang="zh-TW" altLang="en-US" sz="2000" dirty="0" smtClean="0"/>
-              <a:t>實作 </a:t>
-            </a:r>
-            <a:r>
-              <a:rPr kumimoji="1" lang="mr-IN" altLang="zh-TW" sz="2000" dirty="0"/>
-              <a:t>–</a:t>
-            </a:r>
-            <a:r>
-              <a:rPr kumimoji="1" lang="en-US" altLang="zh-TW" sz="2000" dirty="0"/>
-              <a:t> 0</a:t>
-            </a:r>
-            <a:r>
-              <a:rPr kumimoji="1" lang="en-US" altLang="zh-TW" sz="2000" dirty="0" smtClean="0"/>
-              <a:t>%</a:t>
-            </a:r>
           </a:p>
           <a:p>
             <a:endParaRPr kumimoji="1" lang="en-US" altLang="zh-TW" sz="2000" dirty="0" smtClean="0"/>
@@ -6622,7 +6581,7 @@
     </p:spTree>
     <p:extLst>
       <p:ext uri="{BB962C8B-B14F-4D97-AF65-F5344CB8AC3E}">
-        <p14:creationId xmlns:p14="http://schemas.microsoft.com/office/powerpoint/2010/main" val="1208590055"/>
+        <p14:creationId xmlns:p14="http://schemas.microsoft.com/office/powerpoint/2010/main" val="1292782152"/>
       </p:ext>
     </p:extLst>
   </p:cSld>
@@ -6724,11 +6683,7 @@
           <a:p>
             <a:r>
               <a:rPr kumimoji="1" lang="en-US" altLang="zh-TW" sz="2000" dirty="0" smtClean="0"/>
-              <a:t>data </a:t>
-            </a:r>
-            <a:r>
-              <a:rPr kumimoji="1" lang="en-US" altLang="zh-TW" sz="2000" dirty="0" smtClean="0"/>
-              <a:t>trans to DB service</a:t>
+              <a:t>data trans to DB service</a:t>
             </a:r>
             <a:r>
               <a:rPr kumimoji="1" lang="zh-TW" altLang="en-US" sz="2000" dirty="0" smtClean="0"/>

</xml_diff>